<commit_message>
Removed project 6, edited project 5 readme
</commit_message>
<xml_diff>
--- a/project_5_multilead_ecg_analysis/presentation/classifying_ecg_data.pptx
+++ b/project_5_multilead_ecg_analysis/presentation/classifying_ecg_data.pptx
@@ -9,13 +9,13 @@
   </p:notesMasterIdLst>
   <p:sldIdLst>
     <p:sldId id="256" r:id="rId2"/>
-    <p:sldId id="257" r:id="rId3"/>
-    <p:sldId id="258" r:id="rId4"/>
-    <p:sldId id="259" r:id="rId5"/>
-    <p:sldId id="262" r:id="rId6"/>
-    <p:sldId id="260" r:id="rId7"/>
-    <p:sldId id="261" r:id="rId8"/>
-    <p:sldId id="263" r:id="rId9"/>
+    <p:sldId id="258" r:id="rId3"/>
+    <p:sldId id="259" r:id="rId4"/>
+    <p:sldId id="262" r:id="rId5"/>
+    <p:sldId id="260" r:id="rId6"/>
+    <p:sldId id="261" r:id="rId7"/>
+    <p:sldId id="263" r:id="rId8"/>
+    <p:sldId id="277" r:id="rId9"/>
     <p:sldId id="264" r:id="rId10"/>
     <p:sldId id="266" r:id="rId11"/>
     <p:sldId id="269" r:id="rId12"/>
@@ -126,6 +126,11 @@
       </a:defRPr>
     </a:lvl9pPr>
   </p:defaultTextStyle>
+  <p:extLst>
+    <p:ext uri="{EFAFB233-063F-42B5-8137-9DF3F51BA10A}">
+      <p15:sldGuideLst xmlns:p15="http://schemas.microsoft.com/office/powerpoint/2012/main"/>
+    </p:ext>
+  </p:extLst>
 </p:presentation>
 </file>
 
@@ -211,7 +216,7 @@
           <a:p>
             <a:fld id="{C7A52143-A821-4E88-863B-FB0717D47A6E}" type="datetimeFigureOut">
               <a:rPr lang="en-US" smtClean="0"/>
-              <a:t>2/23/2021</a:t>
+              <a:t>2/26/2021</a:t>
             </a:fld>
             <a:endParaRPr lang="en-US"/>
           </a:p>
@@ -625,7 +630,7 @@
           <a:p>
             <a:fld id="{9A0AF7ED-DA53-4A75-9FBA-7DC4321E4FAC}" type="datetimeFigureOut">
               <a:rPr lang="en-US" smtClean="0"/>
-              <a:t>2/23/2021</a:t>
+              <a:t>2/26/2021</a:t>
             </a:fld>
             <a:endParaRPr lang="en-US"/>
           </a:p>
@@ -823,7 +828,7 @@
           <a:p>
             <a:fld id="{9A0AF7ED-DA53-4A75-9FBA-7DC4321E4FAC}" type="datetimeFigureOut">
               <a:rPr lang="en-US" smtClean="0"/>
-              <a:t>2/23/2021</a:t>
+              <a:t>2/26/2021</a:t>
             </a:fld>
             <a:endParaRPr lang="en-US"/>
           </a:p>
@@ -1031,7 +1036,7 @@
           <a:p>
             <a:fld id="{9A0AF7ED-DA53-4A75-9FBA-7DC4321E4FAC}" type="datetimeFigureOut">
               <a:rPr lang="en-US" smtClean="0"/>
-              <a:t>2/23/2021</a:t>
+              <a:t>2/26/2021</a:t>
             </a:fld>
             <a:endParaRPr lang="en-US"/>
           </a:p>
@@ -1229,7 +1234,7 @@
           <a:p>
             <a:fld id="{9A0AF7ED-DA53-4A75-9FBA-7DC4321E4FAC}" type="datetimeFigureOut">
               <a:rPr lang="en-US" smtClean="0"/>
-              <a:t>2/23/2021</a:t>
+              <a:t>2/26/2021</a:t>
             </a:fld>
             <a:endParaRPr lang="en-US"/>
           </a:p>
@@ -1504,7 +1509,7 @@
           <a:p>
             <a:fld id="{9A0AF7ED-DA53-4A75-9FBA-7DC4321E4FAC}" type="datetimeFigureOut">
               <a:rPr lang="en-US" smtClean="0"/>
-              <a:t>2/23/2021</a:t>
+              <a:t>2/26/2021</a:t>
             </a:fld>
             <a:endParaRPr lang="en-US"/>
           </a:p>
@@ -1769,7 +1774,7 @@
           <a:p>
             <a:fld id="{9A0AF7ED-DA53-4A75-9FBA-7DC4321E4FAC}" type="datetimeFigureOut">
               <a:rPr lang="en-US" smtClean="0"/>
-              <a:t>2/23/2021</a:t>
+              <a:t>2/26/2021</a:t>
             </a:fld>
             <a:endParaRPr lang="en-US"/>
           </a:p>
@@ -2181,7 +2186,7 @@
           <a:p>
             <a:fld id="{9A0AF7ED-DA53-4A75-9FBA-7DC4321E4FAC}" type="datetimeFigureOut">
               <a:rPr lang="en-US" smtClean="0"/>
-              <a:t>2/23/2021</a:t>
+              <a:t>2/26/2021</a:t>
             </a:fld>
             <a:endParaRPr lang="en-US"/>
           </a:p>
@@ -2322,7 +2327,7 @@
           <a:p>
             <a:fld id="{9A0AF7ED-DA53-4A75-9FBA-7DC4321E4FAC}" type="datetimeFigureOut">
               <a:rPr lang="en-US" smtClean="0"/>
-              <a:t>2/23/2021</a:t>
+              <a:t>2/26/2021</a:t>
             </a:fld>
             <a:endParaRPr lang="en-US"/>
           </a:p>
@@ -2435,7 +2440,7 @@
           <a:p>
             <a:fld id="{9A0AF7ED-DA53-4A75-9FBA-7DC4321E4FAC}" type="datetimeFigureOut">
               <a:rPr lang="en-US" smtClean="0"/>
-              <a:t>2/23/2021</a:t>
+              <a:t>2/26/2021</a:t>
             </a:fld>
             <a:endParaRPr lang="en-US"/>
           </a:p>
@@ -2746,7 +2751,7 @@
           <a:p>
             <a:fld id="{9A0AF7ED-DA53-4A75-9FBA-7DC4321E4FAC}" type="datetimeFigureOut">
               <a:rPr lang="en-US" smtClean="0"/>
-              <a:t>2/23/2021</a:t>
+              <a:t>2/26/2021</a:t>
             </a:fld>
             <a:endParaRPr lang="en-US"/>
           </a:p>
@@ -3034,7 +3039,7 @@
           <a:p>
             <a:fld id="{9A0AF7ED-DA53-4A75-9FBA-7DC4321E4FAC}" type="datetimeFigureOut">
               <a:rPr lang="en-US" smtClean="0"/>
-              <a:t>2/23/2021</a:t>
+              <a:t>2/26/2021</a:t>
             </a:fld>
             <a:endParaRPr lang="en-US"/>
           </a:p>
@@ -3275,7 +3280,7 @@
           <a:p>
             <a:fld id="{9A0AF7ED-DA53-4A75-9FBA-7DC4321E4FAC}" type="datetimeFigureOut">
               <a:rPr lang="en-US" smtClean="0"/>
-              <a:t>2/23/2021</a:t>
+              <a:t>2/26/2021</a:t>
             </a:fld>
             <a:endParaRPr lang="en-US"/>
           </a:p>
@@ -3743,7 +3748,7 @@
           <a:p>
             <a:r>
               <a:rPr lang="en-US" dirty="0"/>
-              <a:t>A particular kind of time-series data</a:t>
+              <a:t>A particular kind of medical time-series data</a:t>
             </a:r>
           </a:p>
         </p:txBody>
@@ -3911,15 +3916,7 @@
           <a:p>
             <a:r>
               <a:rPr lang="en-US" b="1" dirty="0"/>
-              <a:t>Time domain, Frequency domain, Time-</a:t>
-            </a:r>
-            <a:r>
-              <a:rPr lang="en-US" b="1" dirty="0" err="1"/>
-              <a:t>Freuency</a:t>
-            </a:r>
-            <a:r>
-              <a:rPr lang="en-US" b="1" dirty="0"/>
-              <a:t> domain</a:t>
+              <a:t>Time domain, Frequency domain, Time-Frequency domain</a:t>
             </a:r>
           </a:p>
         </p:txBody>
@@ -4624,20 +4621,48 @@
           <a:lstStyle/>
           <a:p>
             <a:r>
+              <a:rPr lang="en-US" b="1" dirty="0"/>
+              <a:t>Statistical features</a:t>
+            </a:r>
+            <a:r>
               <a:rPr lang="en-US" dirty="0"/>
-              <a:t>Statistical features: Kurtosis and Skew</a:t>
-            </a:r>
-          </a:p>
-          <a:p>
+              <a:t>: Kurtosis and Skew</a:t>
+            </a:r>
+          </a:p>
+          <a:p>
+            <a:r>
+              <a:rPr lang="en-US" b="1" dirty="0"/>
+              <a:t>Features about power and frequency</a:t>
+            </a:r>
             <a:r>
               <a:rPr lang="en-US" dirty="0"/>
-              <a:t>Features about power and frequency: Fast-Fourier Transformed signal</a:t>
-            </a:r>
-          </a:p>
-          <a:p>
+              <a:t>: Fast-Fourier Transformed, </a:t>
+            </a:r>
+            <a:r>
+              <a:rPr lang="en-US"/>
+              <a:t>Short-time </a:t>
+            </a:r>
             <a:r>
               <a:rPr lang="en-US" dirty="0"/>
-              <a:t>Amplitude features: Max, Min, and Avg height of the peaks in the wave</a:t>
+              <a:t>F</a:t>
+            </a:r>
+            <a:r>
+              <a:rPr lang="en-US"/>
+              <a:t>ourier </a:t>
+            </a:r>
+            <a:r>
+              <a:rPr lang="en-US" dirty="0"/>
+              <a:t>transformed signal</a:t>
+            </a:r>
+          </a:p>
+          <a:p>
+            <a:r>
+              <a:rPr lang="en-US" b="1" dirty="0"/>
+              <a:t>Amplitude features</a:t>
+            </a:r>
+            <a:r>
+              <a:rPr lang="en-US" dirty="0"/>
+              <a:t>: Max, Min, and Avg height of the peaks in the wave</a:t>
             </a:r>
           </a:p>
           <a:p>
@@ -4907,7 +4932,7 @@
           <p:nvPr>
             <p:extLst>
               <p:ext uri="{D42A27DB-BD31-4B8C-83A1-F6EECF244321}">
-                <p14:modId xmlns:p14="http://schemas.microsoft.com/office/powerpoint/2010/main" val="3128812698"/>
+                <p14:modId xmlns:p14="http://schemas.microsoft.com/office/powerpoint/2010/main" val="2826443496"/>
               </p:ext>
             </p:extLst>
           </p:nvPr>
@@ -5255,7 +5280,7 @@
                     <a:p>
                       <a:r>
                         <a:rPr lang="en-US" dirty="0"/>
-                        <a:t>3</a:t>
+                        <a:t>3 [NORM]</a:t>
                       </a:r>
                     </a:p>
                   </a:txBody>
@@ -5537,7 +5562,7 @@
           <p:cNvPr id="2" name="Title 1">
             <a:extLst>
               <a:ext uri="{FF2B5EF4-FFF2-40B4-BE49-F238E27FC236}">
-                <a16:creationId xmlns:a16="http://schemas.microsoft.com/office/drawing/2014/main" id="{ED441CE0-AE8A-47AC-9735-3CBDFFCAC6C1}"/>
+                <a16:creationId xmlns:a16="http://schemas.microsoft.com/office/drawing/2014/main" id="{6BA0FFAE-4A6E-4AB0-9783-A89474E2CEF2}"/>
               </a:ext>
             </a:extLst>
           </p:cNvPr>
@@ -5555,7 +5580,7 @@
           <a:p>
             <a:r>
               <a:rPr lang="en-US" b="1" dirty="0"/>
-              <a:t>Who am I?</a:t>
+              <a:t>Structure of the talk</a:t>
             </a:r>
           </a:p>
         </p:txBody>
@@ -5565,7 +5590,7 @@
           <p:cNvPr id="3" name="Content Placeholder 2">
             <a:extLst>
               <a:ext uri="{FF2B5EF4-FFF2-40B4-BE49-F238E27FC236}">
-                <a16:creationId xmlns:a16="http://schemas.microsoft.com/office/drawing/2014/main" id="{164630E2-52F6-4796-AF60-7040D2C97AB9}"/>
+                <a16:creationId xmlns:a16="http://schemas.microsoft.com/office/drawing/2014/main" id="{F9E0846D-851B-4637-A5BC-1DFF05E552C5}"/>
               </a:ext>
             </a:extLst>
           </p:cNvPr>
@@ -5582,8 +5607,32 @@
           <a:lstStyle/>
           <a:p>
             <a:r>
+              <a:rPr lang="en-US" b="1" dirty="0"/>
+              <a:t>Explanation of ECG data</a:t>
+            </a:r>
+          </a:p>
+          <a:p>
+            <a:r>
               <a:rPr lang="en-US" dirty="0"/>
-              <a:t>I’m Nemo, someone who’s interested in applying data science/machine learning techniques to medicine, biology, and health</a:t>
+              <a:t>Goal of classifying ECG data</a:t>
+            </a:r>
+          </a:p>
+          <a:p>
+            <a:r>
+              <a:rPr lang="en-US" dirty="0"/>
+              <a:t>Data Exploration</a:t>
+            </a:r>
+          </a:p>
+          <a:p>
+            <a:r>
+              <a:rPr lang="en-US" dirty="0"/>
+              <a:t>Classification techniques</a:t>
+            </a:r>
+          </a:p>
+          <a:p>
+            <a:r>
+              <a:rPr lang="en-US" dirty="0"/>
+              <a:t>Challenges faced</a:t>
             </a:r>
           </a:p>
         </p:txBody>
@@ -5591,7 +5640,7 @@
     </p:spTree>
     <p:extLst>
       <p:ext uri="{BB962C8B-B14F-4D97-AF65-F5344CB8AC3E}">
-        <p14:creationId xmlns:p14="http://schemas.microsoft.com/office/powerpoint/2010/main" val="1990548454"/>
+        <p14:creationId xmlns:p14="http://schemas.microsoft.com/office/powerpoint/2010/main" val="1735855830"/>
       </p:ext>
     </p:extLst>
   </p:cSld>
@@ -5715,116 +5764,6 @@
           <p:cNvPr id="2" name="Title 1">
             <a:extLst>
               <a:ext uri="{FF2B5EF4-FFF2-40B4-BE49-F238E27FC236}">
-                <a16:creationId xmlns:a16="http://schemas.microsoft.com/office/drawing/2014/main" id="{6BA0FFAE-4A6E-4AB0-9783-A89474E2CEF2}"/>
-              </a:ext>
-            </a:extLst>
-          </p:cNvPr>
-          <p:cNvSpPr>
-            <a:spLocks noGrp="1"/>
-          </p:cNvSpPr>
-          <p:nvPr>
-            <p:ph type="title"/>
-          </p:nvPr>
-        </p:nvSpPr>
-        <p:spPr/>
-        <p:txBody>
-          <a:bodyPr/>
-          <a:lstStyle/>
-          <a:p>
-            <a:r>
-              <a:rPr lang="en-US" b="1" dirty="0"/>
-              <a:t>Structure of the talk</a:t>
-            </a:r>
-          </a:p>
-        </p:txBody>
-      </p:sp>
-      <p:sp>
-        <p:nvSpPr>
-          <p:cNvPr id="3" name="Content Placeholder 2">
-            <a:extLst>
-              <a:ext uri="{FF2B5EF4-FFF2-40B4-BE49-F238E27FC236}">
-                <a16:creationId xmlns:a16="http://schemas.microsoft.com/office/drawing/2014/main" id="{F9E0846D-851B-4637-A5BC-1DFF05E552C5}"/>
-              </a:ext>
-            </a:extLst>
-          </p:cNvPr>
-          <p:cNvSpPr>
-            <a:spLocks noGrp="1"/>
-          </p:cNvSpPr>
-          <p:nvPr>
-            <p:ph idx="1"/>
-          </p:nvPr>
-        </p:nvSpPr>
-        <p:spPr/>
-        <p:txBody>
-          <a:bodyPr/>
-          <a:lstStyle/>
-          <a:p>
-            <a:r>
-              <a:rPr lang="en-US" b="1" dirty="0"/>
-              <a:t>Explanation of ECG data</a:t>
-            </a:r>
-          </a:p>
-          <a:p>
-            <a:r>
-              <a:rPr lang="en-US" dirty="0"/>
-              <a:t>Goal of classifying ECG data</a:t>
-            </a:r>
-          </a:p>
-          <a:p>
-            <a:r>
-              <a:rPr lang="en-US" dirty="0"/>
-              <a:t>Data Exploration</a:t>
-            </a:r>
-          </a:p>
-          <a:p>
-            <a:r>
-              <a:rPr lang="en-US" dirty="0"/>
-              <a:t>Classification techniques</a:t>
-            </a:r>
-          </a:p>
-          <a:p>
-            <a:r>
-              <a:rPr lang="en-US" dirty="0"/>
-              <a:t>Challenges faced</a:t>
-            </a:r>
-          </a:p>
-        </p:txBody>
-      </p:sp>
-    </p:spTree>
-    <p:extLst>
-      <p:ext uri="{BB962C8B-B14F-4D97-AF65-F5344CB8AC3E}">
-        <p14:creationId xmlns:p14="http://schemas.microsoft.com/office/powerpoint/2010/main" val="1735855830"/>
-      </p:ext>
-    </p:extLst>
-  </p:cSld>
-  <p:clrMapOvr>
-    <a:masterClrMapping/>
-  </p:clrMapOvr>
-</p:sld>
-</file>
-
-<file path=ppt/slides/slide4.xml><?xml version="1.0" encoding="utf-8"?>
-<p:sld xmlns:a="http://schemas.openxmlformats.org/drawingml/2006/main" xmlns:r="http://schemas.openxmlformats.org/officeDocument/2006/relationships" xmlns:p="http://schemas.openxmlformats.org/presentationml/2006/main">
-  <p:cSld>
-    <p:spTree>
-      <p:nvGrpSpPr>
-        <p:cNvPr id="1" name=""/>
-        <p:cNvGrpSpPr/>
-        <p:nvPr/>
-      </p:nvGrpSpPr>
-      <p:grpSpPr>
-        <a:xfrm>
-          <a:off x="0" y="0"/>
-          <a:ext cx="0" cy="0"/>
-          <a:chOff x="0" y="0"/>
-          <a:chExt cx="0" cy="0"/>
-        </a:xfrm>
-      </p:grpSpPr>
-      <p:sp>
-        <p:nvSpPr>
-          <p:cNvPr id="2" name="Title 1">
-            <a:extLst>
-              <a:ext uri="{FF2B5EF4-FFF2-40B4-BE49-F238E27FC236}">
                 <a16:creationId xmlns:a16="http://schemas.microsoft.com/office/drawing/2014/main" id="{9736699E-B116-42A7-9523-CF682AB0422F}"/>
               </a:ext>
             </a:extLst>
@@ -5901,13 +5840,13 @@
           <a:p>
             <a:r>
               <a:rPr lang="en-US" dirty="0"/>
-              <a:t>Used to track strength and direction of electrical signals through the heart</a:t>
+              <a:t>Used to track strength and direction of electrical signals through the heart, which correlates with healthy/diseased heart states</a:t>
             </a:r>
           </a:p>
           <a:p>
             <a:r>
               <a:rPr lang="en-US" dirty="0"/>
-              <a:t>Up to twelve channels, called ‘leads’.</a:t>
+              <a:t>Up to 12 channels (i.e. 12 ‘views of the heart’), called ‘leads’.</a:t>
             </a:r>
           </a:p>
         </p:txBody>
@@ -5925,7 +5864,7 @@
 </p:sld>
 </file>
 
-<file path=ppt/slides/slide5.xml><?xml version="1.0" encoding="utf-8"?>
+<file path=ppt/slides/slide4.xml><?xml version="1.0" encoding="utf-8"?>
 <p:sld xmlns:a="http://schemas.openxmlformats.org/drawingml/2006/main" xmlns:r="http://schemas.openxmlformats.org/officeDocument/2006/relationships" xmlns:p="http://schemas.openxmlformats.org/presentationml/2006/main">
   <p:cSld>
     <p:spTree>
@@ -6019,7 +5958,7 @@
 </p:sld>
 </file>
 
-<file path=ppt/slides/slide6.xml><?xml version="1.0" encoding="utf-8"?>
+<file path=ppt/slides/slide5.xml><?xml version="1.0" encoding="utf-8"?>
 <p:sld xmlns:a="http://schemas.openxmlformats.org/drawingml/2006/main" xmlns:r="http://schemas.openxmlformats.org/officeDocument/2006/relationships" xmlns:p="http://schemas.openxmlformats.org/presentationml/2006/main">
   <p:cSld>
     <p:spTree>
@@ -6112,7 +6051,7 @@
 </p:sld>
 </file>
 
-<file path=ppt/slides/slide7.xml><?xml version="1.0" encoding="utf-8"?>
+<file path=ppt/slides/slide6.xml><?xml version="1.0" encoding="utf-8"?>
 <p:sld xmlns:a="http://schemas.openxmlformats.org/drawingml/2006/main" xmlns:r="http://schemas.openxmlformats.org/officeDocument/2006/relationships" xmlns:p="http://schemas.openxmlformats.org/presentationml/2006/main">
   <p:cSld>
     <p:spTree>
@@ -6241,6 +6180,116 @@
 </p:sld>
 </file>
 
+<file path=ppt/slides/slide7.xml><?xml version="1.0" encoding="utf-8"?>
+<p:sld xmlns:a="http://schemas.openxmlformats.org/drawingml/2006/main" xmlns:r="http://schemas.openxmlformats.org/officeDocument/2006/relationships" xmlns:p="http://schemas.openxmlformats.org/presentationml/2006/main">
+  <p:cSld>
+    <p:spTree>
+      <p:nvGrpSpPr>
+        <p:cNvPr id="1" name=""/>
+        <p:cNvGrpSpPr/>
+        <p:nvPr/>
+      </p:nvGrpSpPr>
+      <p:grpSpPr>
+        <a:xfrm>
+          <a:off x="0" y="0"/>
+          <a:ext cx="0" cy="0"/>
+          <a:chOff x="0" y="0"/>
+          <a:chExt cx="0" cy="0"/>
+        </a:xfrm>
+      </p:grpSpPr>
+      <p:sp>
+        <p:nvSpPr>
+          <p:cNvPr id="2" name="Title 1">
+            <a:extLst>
+              <a:ext uri="{FF2B5EF4-FFF2-40B4-BE49-F238E27FC236}">
+                <a16:creationId xmlns:a16="http://schemas.microsoft.com/office/drawing/2014/main" id="{6BA0FFAE-4A6E-4AB0-9783-A89474E2CEF2}"/>
+              </a:ext>
+            </a:extLst>
+          </p:cNvPr>
+          <p:cNvSpPr>
+            <a:spLocks noGrp="1"/>
+          </p:cNvSpPr>
+          <p:nvPr>
+            <p:ph type="title"/>
+          </p:nvPr>
+        </p:nvSpPr>
+        <p:spPr/>
+        <p:txBody>
+          <a:bodyPr/>
+          <a:lstStyle/>
+          <a:p>
+            <a:r>
+              <a:rPr lang="en-US" b="1" dirty="0"/>
+              <a:t>Structure of the talk</a:t>
+            </a:r>
+          </a:p>
+        </p:txBody>
+      </p:sp>
+      <p:sp>
+        <p:nvSpPr>
+          <p:cNvPr id="3" name="Content Placeholder 2">
+            <a:extLst>
+              <a:ext uri="{FF2B5EF4-FFF2-40B4-BE49-F238E27FC236}">
+                <a16:creationId xmlns:a16="http://schemas.microsoft.com/office/drawing/2014/main" id="{F9E0846D-851B-4637-A5BC-1DFF05E552C5}"/>
+              </a:ext>
+            </a:extLst>
+          </p:cNvPr>
+          <p:cNvSpPr>
+            <a:spLocks noGrp="1"/>
+          </p:cNvSpPr>
+          <p:nvPr>
+            <p:ph idx="1"/>
+          </p:nvPr>
+        </p:nvSpPr>
+        <p:spPr/>
+        <p:txBody>
+          <a:bodyPr/>
+          <a:lstStyle/>
+          <a:p>
+            <a:r>
+              <a:rPr lang="en-US" dirty="0"/>
+              <a:t>Explanation of ECG data</a:t>
+            </a:r>
+          </a:p>
+          <a:p>
+            <a:r>
+              <a:rPr lang="en-US" b="1" dirty="0"/>
+              <a:t>Goal of classifying ECG data</a:t>
+            </a:r>
+          </a:p>
+          <a:p>
+            <a:r>
+              <a:rPr lang="en-US" dirty="0"/>
+              <a:t>Data Exploration</a:t>
+            </a:r>
+          </a:p>
+          <a:p>
+            <a:r>
+              <a:rPr lang="en-US" dirty="0"/>
+              <a:t>Classification techniques</a:t>
+            </a:r>
+          </a:p>
+          <a:p>
+            <a:r>
+              <a:rPr lang="en-US" dirty="0"/>
+              <a:t>Challenges faced</a:t>
+            </a:r>
+          </a:p>
+        </p:txBody>
+      </p:sp>
+    </p:spTree>
+    <p:extLst>
+      <p:ext uri="{BB962C8B-B14F-4D97-AF65-F5344CB8AC3E}">
+        <p14:creationId xmlns:p14="http://schemas.microsoft.com/office/powerpoint/2010/main" val="2450979798"/>
+      </p:ext>
+    </p:extLst>
+  </p:cSld>
+  <p:clrMapOvr>
+    <a:masterClrMapping/>
+  </p:clrMapOvr>
+</p:sld>
+</file>
+
 <file path=ppt/slides/slide8.xml><?xml version="1.0" encoding="utf-8"?>
 <p:sld xmlns:a="http://schemas.openxmlformats.org/drawingml/2006/main" xmlns:r="http://schemas.openxmlformats.org/officeDocument/2006/relationships" xmlns:p="http://schemas.openxmlformats.org/presentationml/2006/main">
   <p:cSld>
@@ -6263,7 +6312,7 @@
           <p:cNvPr id="2" name="Title 1">
             <a:extLst>
               <a:ext uri="{FF2B5EF4-FFF2-40B4-BE49-F238E27FC236}">
-                <a16:creationId xmlns:a16="http://schemas.microsoft.com/office/drawing/2014/main" id="{6BA0FFAE-4A6E-4AB0-9783-A89474E2CEF2}"/>
+                <a16:creationId xmlns:a16="http://schemas.microsoft.com/office/drawing/2014/main" id="{38410997-A3EF-4482-B48E-2A9870AC7C0B}"/>
               </a:ext>
             </a:extLst>
           </p:cNvPr>
@@ -6281,7 +6330,7 @@
           <a:p>
             <a:r>
               <a:rPr lang="en-US" b="1" dirty="0"/>
-              <a:t>Structure of the talk</a:t>
+              <a:t>Problem Statement</a:t>
             </a:r>
           </a:p>
         </p:txBody>
@@ -6291,7 +6340,7 @@
           <p:cNvPr id="3" name="Content Placeholder 2">
             <a:extLst>
               <a:ext uri="{FF2B5EF4-FFF2-40B4-BE49-F238E27FC236}">
-                <a16:creationId xmlns:a16="http://schemas.microsoft.com/office/drawing/2014/main" id="{F9E0846D-851B-4637-A5BC-1DFF05E552C5}"/>
+                <a16:creationId xmlns:a16="http://schemas.microsoft.com/office/drawing/2014/main" id="{55136579-CB10-4C2D-BC94-22A4FF52FAE0}"/>
               </a:ext>
             </a:extLst>
           </p:cNvPr>
@@ -6308,40 +6357,37 @@
           <a:lstStyle/>
           <a:p>
             <a:r>
+              <a:rPr lang="en-US" b="1" dirty="0"/>
+              <a:t>Problem</a:t>
+            </a:r>
+            <a:r>
               <a:rPr lang="en-US" dirty="0"/>
-              <a:t>Explanation of ECG data</a:t>
-            </a:r>
+              <a:t>: ECG interpretation takes years of training and mistakes can be made as doctors work long hours</a:t>
+            </a:r>
+          </a:p>
+          <a:p>
+            <a:pPr marL="0" indent="0">
+              <a:buNone/>
+            </a:pPr>
+            <a:endParaRPr lang="en-US" dirty="0"/>
           </a:p>
           <a:p>
             <a:r>
               <a:rPr lang="en-US" b="1" dirty="0"/>
-              <a:t>Goal of classifying ECG data</a:t>
-            </a:r>
-          </a:p>
-          <a:p>
+              <a:t>Goal of this project</a:t>
+            </a:r>
             <a:r>
               <a:rPr lang="en-US" dirty="0"/>
-              <a:t>Data Exploration</a:t>
-            </a:r>
-          </a:p>
-          <a:p>
-            <a:r>
-              <a:rPr lang="en-US" dirty="0"/>
-              <a:t>Classification techniques</a:t>
-            </a:r>
-          </a:p>
-          <a:p>
-            <a:r>
-              <a:rPr lang="en-US" dirty="0"/>
-              <a:t>Challenges faced</a:t>
-            </a:r>
+              <a:t>: Automatic classification of ECGs into 1 of 6 classes, 1 healthy class and 5 diseased classes</a:t>
+            </a:r>
+            <a:endParaRPr lang="en-US" b="1" dirty="0"/>
           </a:p>
         </p:txBody>
       </p:sp>
     </p:spTree>
     <p:extLst>
       <p:ext uri="{BB962C8B-B14F-4D97-AF65-F5344CB8AC3E}">
-        <p14:creationId xmlns:p14="http://schemas.microsoft.com/office/powerpoint/2010/main" val="2450979798"/>
+        <p14:creationId xmlns:p14="http://schemas.microsoft.com/office/powerpoint/2010/main" val="3667452922"/>
       </p:ext>
     </p:extLst>
   </p:cSld>

</xml_diff>